<commit_message>
BinhNTT_Update Slide Report1 Presentation
</commit_message>
<xml_diff>
--- a/Report/Report1_DYs-Group_Slide.pptx
+++ b/Report/Report1_DYs-Group_Slide.pptx
@@ -226,7 +226,7 @@
           <a:p>
             <a:fld id="{41658A34-83F4-4B2E-BC5A-DE51EE8822F9}" type="datetimeFigureOut">
               <a:rPr lang="en-US" smtClean="0"/>
-              <a:t>10/14/2018</a:t>
+              <a:t>10/15/18</a:t>
             </a:fld>
             <a:endParaRPr lang="en-US"/>
           </a:p>
@@ -391,7 +391,7 @@
           <a:p>
             <a:fld id="{7F2E1917-0BAF-4687-978A-82FFF05559C3}" type="datetimeFigureOut">
               <a:rPr lang="en-US" smtClean="0"/>
-              <a:t>10/14/2018</a:t>
+              <a:t>10/15/18</a:t>
             </a:fld>
             <a:endParaRPr lang="en-US"/>
           </a:p>
@@ -1580,7 +1580,7 @@
           <a:p>
             <a:fld id="{84EAB7D7-3608-4730-B2E2-670834DF882C}" type="datetimeFigureOut">
               <a:rPr lang="en-US" smtClean="0"/>
-              <a:t>10/14/2018</a:t>
+              <a:t>10/15/18</a:t>
             </a:fld>
             <a:endParaRPr lang="en-US"/>
           </a:p>
@@ -3048,7 +3048,7 @@
           <a:p>
             <a:fld id="{84EAB7D7-3608-4730-B2E2-670834DF882C}" type="datetimeFigureOut">
               <a:rPr lang="en-US" smtClean="0"/>
-              <a:t>10/14/2018</a:t>
+              <a:t>10/15/18</a:t>
             </a:fld>
             <a:endParaRPr lang="en-US"/>
           </a:p>
@@ -4430,7 +4430,7 @@
           <a:p>
             <a:fld id="{84EAB7D7-3608-4730-B2E2-670834DF882C}" type="datetimeFigureOut">
               <a:rPr lang="en-US" smtClean="0"/>
-              <a:t>10/14/2018</a:t>
+              <a:t>10/15/18</a:t>
             </a:fld>
             <a:endParaRPr lang="en-US"/>
           </a:p>
@@ -5185,7 +5185,7 @@
           <a:p>
             <a:fld id="{84EAB7D7-3608-4730-B2E2-670834DF882C}" type="datetimeFigureOut">
               <a:rPr lang="en-US" smtClean="0"/>
-              <a:t>10/14/2018</a:t>
+              <a:t>10/15/18</a:t>
             </a:fld>
             <a:endParaRPr lang="en-US"/>
           </a:p>
@@ -14271,7 +14271,7 @@
           <a:p>
             <a:fld id="{84EAB7D7-3608-4730-B2E2-670834DF882C}" type="datetimeFigureOut">
               <a:rPr lang="en-US" smtClean="0"/>
-              <a:t>10/14/2018</a:t>
+              <a:t>10/15/18</a:t>
             </a:fld>
             <a:endParaRPr lang="en-US"/>
           </a:p>
@@ -21529,7 +21529,7 @@
           <a:p>
             <a:fld id="{84EAB7D7-3608-4730-B2E2-670834DF882C}" type="datetimeFigureOut">
               <a:rPr lang="en-US" smtClean="0"/>
-              <a:t>10/14/2018</a:t>
+              <a:t>10/15/18</a:t>
             </a:fld>
             <a:endParaRPr lang="en-US"/>
           </a:p>
@@ -22911,7 +22911,7 @@
           <a:p>
             <a:fld id="{84EAB7D7-3608-4730-B2E2-670834DF882C}" type="datetimeFigureOut">
               <a:rPr lang="en-US" smtClean="0"/>
-              <a:t>10/14/2018</a:t>
+              <a:t>10/15/18</a:t>
             </a:fld>
             <a:endParaRPr lang="en-US"/>
           </a:p>
@@ -25103,7 +25103,7 @@
           <a:p>
             <a:fld id="{84EAB7D7-3608-4730-B2E2-670834DF882C}" type="datetimeFigureOut">
               <a:rPr lang="en-US" smtClean="0"/>
-              <a:t>10/14/2018</a:t>
+              <a:t>10/15/18</a:t>
             </a:fld>
             <a:endParaRPr lang="en-US"/>
           </a:p>
@@ -26215,7 +26215,7 @@
           <a:p>
             <a:fld id="{84EAB7D7-3608-4730-B2E2-670834DF882C}" type="datetimeFigureOut">
               <a:rPr lang="en-US" smtClean="0"/>
-              <a:t>10/14/2018</a:t>
+              <a:t>10/15/18</a:t>
             </a:fld>
             <a:endParaRPr lang="en-US"/>
           </a:p>
@@ -27057,7 +27057,7 @@
           <a:p>
             <a:fld id="{84EAB7D7-3608-4730-B2E2-670834DF882C}" type="datetimeFigureOut">
               <a:rPr lang="en-US" smtClean="0"/>
-              <a:t>10/14/2018</a:t>
+              <a:t>10/15/18</a:t>
             </a:fld>
             <a:endParaRPr lang="en-US"/>
           </a:p>
@@ -28709,7 +28709,7 @@
           <a:p>
             <a:fld id="{84EAB7D7-3608-4730-B2E2-670834DF882C}" type="datetimeFigureOut">
               <a:rPr lang="en-US" smtClean="0"/>
-              <a:t>10/14/2018</a:t>
+              <a:t>10/15/18</a:t>
             </a:fld>
             <a:endParaRPr lang="en-US"/>
           </a:p>
@@ -30361,7 +30361,7 @@
           <a:p>
             <a:fld id="{84EAB7D7-3608-4730-B2E2-670834DF882C}" type="datetimeFigureOut">
               <a:rPr lang="en-US" smtClean="0"/>
-              <a:t>10/14/2018</a:t>
+              <a:t>10/15/18</a:t>
             </a:fld>
             <a:endParaRPr lang="en-US"/>
           </a:p>
@@ -31837,7 +31837,7 @@
             <a:fld id="{84EAB7D7-3608-4730-B2E2-670834DF882C}" type="datetimeFigureOut">
               <a:rPr lang="en-US" smtClean="0"/>
               <a:pPr/>
-              <a:t>10/14/2018</a:t>
+              <a:t>10/15/18</a:t>
             </a:fld>
             <a:endParaRPr lang="en-US"/>
           </a:p>
@@ -35384,26 +35384,14 @@
           <a:p>
             <a:r>
               <a:rPr lang="en-US" sz="8000" b="1" dirty="0"/>
-              <a:t>DY Emergency </a:t>
-            </a:r>
-            <a:r>
-              <a:rPr lang="en-US" sz="8000" b="1" dirty="0" smtClean="0"/>
-              <a:t>Response</a:t>
-            </a:r>
-            <a:r>
-              <a:rPr lang="en-US" sz="7200" b="1" dirty="0" smtClean="0"/>
-              <a:t/>
+              <a:t>DY Emergency Response</a:t>
             </a:r>
             <a:br>
-              <a:rPr lang="en-US" sz="7200" b="1" dirty="0" smtClean="0"/>
+              <a:rPr lang="en-US" sz="7200" b="1" dirty="0"/>
             </a:br>
             <a:r>
-              <a:rPr lang="en-MY" sz="4400" dirty="0" smtClean="0"/>
-              <a:t>Report </a:t>
-            </a:r>
-            <a:r>
               <a:rPr lang="en-MY" sz="4400" dirty="0"/>
-              <a:t>1 - Introduction</a:t>
+              <a:t>Report 1 - Introduction</a:t>
             </a:r>
             <a:endParaRPr lang="en-US" sz="4400" dirty="0"/>
           </a:p>
@@ -35688,7 +35676,7 @@
               <a:t>Supervisor</a:t>
             </a:r>
             <a:r>
-              <a:rPr lang="en-US" sz="2000" b="1" u="sng" kern="0" dirty="0" smtClean="0"/>
+              <a:rPr lang="en-US" sz="2000" b="1" u="sng" kern="0" dirty="0"/>
               <a:t>: </a:t>
             </a:r>
           </a:p>
@@ -35828,7 +35816,7 @@
             <a:pPr lvl="0"/>
             <a:r>
               <a:rPr lang="en-MY" sz="1800" dirty="0"/>
-              <a:t>Manage accounts of other administrators, coordinators and students.</a:t>
+              <a:t>Manage accounts of other coordinators and students.</a:t>
             </a:r>
             <a:endParaRPr lang="vi-VN" sz="1800" dirty="0"/>
           </a:p>
@@ -35852,15 +35840,14 @@
             </a:r>
             <a:r>
               <a:rPr lang="en-US" sz="1800" dirty="0"/>
-              <a:t>one or more students at a time.</a:t>
+              <a:t>one or more groups of students at the same time.</a:t>
             </a:r>
-            <a:endParaRPr lang="vi-VN" sz="1800" dirty="0"/>
           </a:p>
           <a:p>
             <a:pPr lvl="0"/>
             <a:r>
-              <a:rPr lang="en-MY" sz="1800" dirty="0"/>
-              <a:t>View students’ responses to their notifications.</a:t>
+              <a:rPr lang="en-US" sz="1800" dirty="0"/>
+              <a:t>Create notification to DYC.</a:t>
             </a:r>
             <a:endParaRPr lang="vi-VN" sz="1800" dirty="0"/>
           </a:p>
@@ -35876,7 +35863,7 @@
             <a:pPr lvl="0"/>
             <a:r>
               <a:rPr lang="en-MY" sz="1800" dirty="0"/>
-              <a:t>Generate report.</a:t>
+              <a:t>Review report.</a:t>
             </a:r>
             <a:endParaRPr lang="vi-VN" sz="1800" dirty="0"/>
           </a:p>
@@ -35981,7 +35968,7 @@
         </p:nvGraphicFramePr>
         <p:xfrm>
           <a:off x="478566" y="1598849"/>
-          <a:ext cx="8426151" cy="4120410"/>
+          <a:ext cx="8426151" cy="4109742"/>
         </p:xfrm>
         <a:graphic>
           <a:graphicData uri="http://schemas.openxmlformats.org/drawingml/2006/table">
@@ -35990,11 +35977,41 @@
                 <a:tableStyleId>{5C22544A-7EE6-4342-B048-85BDC9FD1C3A}</a:tableStyleId>
               </a:tblPr>
               <a:tblGrid>
-                <a:gridCol w="561744"/>
-                <a:gridCol w="2685656"/>
-                <a:gridCol w="1375873"/>
-                <a:gridCol w="1213503"/>
-                <a:gridCol w="2589375"/>
+                <a:gridCol w="561744">
+                  <a:extLst>
+                    <a:ext uri="{9D8B030D-6E8A-4147-A177-3AD203B41FA5}">
+                      <a16:colId xmlns:a16="http://schemas.microsoft.com/office/drawing/2014/main" val="20000"/>
+                    </a:ext>
+                  </a:extLst>
+                </a:gridCol>
+                <a:gridCol w="2685656">
+                  <a:extLst>
+                    <a:ext uri="{9D8B030D-6E8A-4147-A177-3AD203B41FA5}">
+                      <a16:colId xmlns:a16="http://schemas.microsoft.com/office/drawing/2014/main" val="20001"/>
+                    </a:ext>
+                  </a:extLst>
+                </a:gridCol>
+                <a:gridCol w="1375873">
+                  <a:extLst>
+                    <a:ext uri="{9D8B030D-6E8A-4147-A177-3AD203B41FA5}">
+                      <a16:colId xmlns:a16="http://schemas.microsoft.com/office/drawing/2014/main" val="20002"/>
+                    </a:ext>
+                  </a:extLst>
+                </a:gridCol>
+                <a:gridCol w="1213503">
+                  <a:extLst>
+                    <a:ext uri="{9D8B030D-6E8A-4147-A177-3AD203B41FA5}">
+                      <a16:colId xmlns:a16="http://schemas.microsoft.com/office/drawing/2014/main" val="20003"/>
+                    </a:ext>
+                  </a:extLst>
+                </a:gridCol>
+                <a:gridCol w="2589375">
+                  <a:extLst>
+                    <a:ext uri="{9D8B030D-6E8A-4147-A177-3AD203B41FA5}">
+                      <a16:colId xmlns:a16="http://schemas.microsoft.com/office/drawing/2014/main" val="20004"/>
+                    </a:ext>
+                  </a:extLst>
+                </a:gridCol>
               </a:tblGrid>
               <a:tr h="357887">
                 <a:tc>
@@ -36142,6 +36159,11 @@
                   </a:txBody>
                   <a:tcPr marL="63500" marR="63500" marT="63500" marB="63500"/>
                 </a:tc>
+                <a:extLst>
+                  <a:ext uri="{0D108BD9-81ED-4DB2-BD59-A6C34878D82A}">
+                    <a16:rowId xmlns:a16="http://schemas.microsoft.com/office/drawing/2014/main" val="10000"/>
+                  </a:ext>
+                </a:extLst>
               </a:tr>
               <a:tr h="581757">
                 <a:tc>
@@ -36289,6 +36311,11 @@
                   </a:txBody>
                   <a:tcPr marL="63500" marR="63500" marT="63500" marB="63500"/>
                 </a:tc>
+                <a:extLst>
+                  <a:ext uri="{0D108BD9-81ED-4DB2-BD59-A6C34878D82A}">
+                    <a16:rowId xmlns:a16="http://schemas.microsoft.com/office/drawing/2014/main" val="10001"/>
+                  </a:ext>
+                </a:extLst>
               </a:tr>
               <a:tr h="537521">
                 <a:tc>
@@ -36472,6 +36499,11 @@
                   </a:txBody>
                   <a:tcPr marL="63500" marR="63500" marT="63500" marB="63500"/>
                 </a:tc>
+                <a:extLst>
+                  <a:ext uri="{0D108BD9-81ED-4DB2-BD59-A6C34878D82A}">
+                    <a16:rowId xmlns:a16="http://schemas.microsoft.com/office/drawing/2014/main" val="10002"/>
+                  </a:ext>
+                </a:extLst>
               </a:tr>
               <a:tr h="758995">
                 <a:tc>
@@ -36606,12 +36638,6 @@
                           <a:spcPts val="0"/>
                         </a:spcAft>
                       </a:pPr>
-                      <a:r>
-                        <a:rPr lang="en-MY" sz="950" dirty="0">
-                          <a:effectLst/>
-                        </a:rPr>
-                        <a:t/>
-                      </a:r>
                       <a:br>
                         <a:rPr lang="en-MY" sz="950" dirty="0">
                           <a:effectLst/>
@@ -36658,6 +36684,11 @@
                   </a:txBody>
                   <a:tcPr marL="63500" marR="63500" marT="63500" marB="63500"/>
                 </a:tc>
+                <a:extLst>
+                  <a:ext uri="{0D108BD9-81ED-4DB2-BD59-A6C34878D82A}">
+                    <a16:rowId xmlns:a16="http://schemas.microsoft.com/office/drawing/2014/main" val="10003"/>
+                  </a:ext>
+                </a:extLst>
               </a:tr>
               <a:tr h="537521">
                 <a:tc>
@@ -36820,6 +36851,11 @@
                   </a:txBody>
                   <a:tcPr marL="63500" marR="63500" marT="63500" marB="63500"/>
                 </a:tc>
+                <a:extLst>
+                  <a:ext uri="{0D108BD9-81ED-4DB2-BD59-A6C34878D82A}">
+                    <a16:rowId xmlns:a16="http://schemas.microsoft.com/office/drawing/2014/main" val="10004"/>
+                  </a:ext>
+                </a:extLst>
               </a:tr>
               <a:tr h="618003">
                 <a:tc>
@@ -36970,6 +37006,11 @@
                   </a:txBody>
                   <a:tcPr marL="63500" marR="63500" marT="63500" marB="63500"/>
                 </a:tc>
+                <a:extLst>
+                  <a:ext uri="{0D108BD9-81ED-4DB2-BD59-A6C34878D82A}">
+                    <a16:rowId xmlns:a16="http://schemas.microsoft.com/office/drawing/2014/main" val="10005"/>
+                  </a:ext>
+                </a:extLst>
               </a:tr>
               <a:tr h="547925">
                 <a:tc>
@@ -37027,13 +37068,7 @@
                         <a:rPr lang="vi-VN" sz="1300" dirty="0">
                           <a:effectLst/>
                         </a:rPr>
-                        <a:t> Thị Xuân </a:t>
-                      </a:r>
-                      <a:r>
-                        <a:rPr lang="vi-VN" sz="1300" dirty="0" smtClean="0">
-                          <a:effectLst/>
-                        </a:rPr>
-                        <a:t>Hạ</a:t>
+                        <a:t> Thị Xuân Hạ</a:t>
                       </a:r>
                     </a:p>
                     <a:p>
@@ -37049,7 +37084,7 @@
                         </a:spcAft>
                       </a:pPr>
                       <a:r>
-                        <a:rPr lang="en-MY" sz="1300" dirty="0" smtClean="0">
+                        <a:rPr lang="en-MY" sz="1300" dirty="0">
                           <a:effectLst/>
                         </a:rPr>
                         <a:t> </a:t>
@@ -37151,6 +37186,11 @@
                   </a:txBody>
                   <a:tcPr marL="63500" marR="63500" marT="63500" marB="63500"/>
                 </a:tc>
+                <a:extLst>
+                  <a:ext uri="{0D108BD9-81ED-4DB2-BD59-A6C34878D82A}">
+                    <a16:rowId xmlns:a16="http://schemas.microsoft.com/office/drawing/2014/main" val="10006"/>
+                  </a:ext>
+                </a:extLst>
               </a:tr>
             </a:tbl>
           </a:graphicData>
@@ -37209,7 +37249,7 @@
           <a:lstStyle/>
           <a:p>
             <a:r>
-              <a:rPr lang="en-US" sz="7200" b="1" dirty="0" smtClean="0"/>
+              <a:rPr lang="en-US" sz="7200" b="1" dirty="0"/>
               <a:t>THANKS FOR WATCHING</a:t>
             </a:r>
             <a:endParaRPr lang="en-US" sz="7200" dirty="0"/>
@@ -37998,7 +38038,7 @@
           <a:p>
             <a:pPr algn="ctr"/>
             <a:r>
-              <a:rPr lang="en-US" dirty="0" smtClean="0"/>
+              <a:rPr lang="en-US" dirty="0"/>
               <a:t>UBD administrators</a:t>
             </a:r>
             <a:endParaRPr lang="vi-VN" dirty="0"/>
@@ -38042,12 +38082,8 @@
           <a:p>
             <a:pPr algn="ctr"/>
             <a:r>
-              <a:rPr lang="en-US" dirty="0" smtClean="0"/>
-              <a:t>UBD </a:t>
-            </a:r>
-            <a:r>
               <a:rPr lang="en-US" dirty="0"/>
-              <a:t>coordinators </a:t>
+              <a:t>UBD coordinators </a:t>
             </a:r>
             <a:endParaRPr lang="vi-VN" dirty="0"/>
           </a:p>
@@ -38090,12 +38126,8 @@
           <a:p>
             <a:pPr algn="ctr"/>
             <a:r>
-              <a:rPr lang="en-US" dirty="0" smtClean="0"/>
-              <a:t>UBD </a:t>
-            </a:r>
-            <a:r>
               <a:rPr lang="en-US" dirty="0"/>
-              <a:t>students </a:t>
+              <a:t>UBD students </a:t>
             </a:r>
             <a:endParaRPr lang="vi-VN" dirty="0"/>
           </a:p>
@@ -38258,15 +38290,7 @@
           <a:p>
             <a:r>
               <a:rPr lang="en-MY" dirty="0"/>
-              <a:t>Currently, Discovery Years (DY) </a:t>
-            </a:r>
-            <a:r>
-              <a:rPr lang="en-MY" dirty="0" smtClean="0"/>
-              <a:t>is </a:t>
-            </a:r>
-            <a:r>
-              <a:rPr lang="en-MY" dirty="0"/>
-              <a:t>80% of their student will go out of country, and there is no program or system can help teacher of UBD can quickly know their student’s status.</a:t>
+              <a:t>Currently, Discovery Years (DY) is 80% of their student will go out of country, and there is no program or system can help teacher of UBD can quickly know their student’s status.</a:t>
             </a:r>
             <a:endParaRPr lang="en-US" dirty="0"/>
           </a:p>
@@ -38335,15 +38359,7 @@
           <a:p>
             <a:r>
               <a:rPr lang="en-MY" dirty="0"/>
-              <a:t>T</a:t>
-            </a:r>
-            <a:r>
-              <a:rPr lang="en-MY" dirty="0" smtClean="0"/>
-              <a:t>hey </a:t>
-            </a:r>
-            <a:r>
-              <a:rPr lang="en-MY" dirty="0"/>
-              <a:t>need an application can help them easy to make a notification and receive student’ answer status automatically </a:t>
+              <a:t>They need an application can help them easy to make a notification and receive student’s answer status automatically </a:t>
             </a:r>
             <a:r>
               <a:rPr lang="en-US" dirty="0"/>
@@ -38463,7 +38479,6 @@
               <a:rPr lang="en-US" dirty="0"/>
               <a:t>The current problem with the system being currently implemented is regarded by the client as being too inefficient and time-consuming</a:t>
             </a:r>
-            <a:endParaRPr lang="en-US" dirty="0"/>
           </a:p>
         </p:txBody>
       </p:sp>
@@ -38504,7 +38519,7 @@
           <a:p>
             <a:pPr algn="ctr"/>
             <a:r>
-              <a:rPr lang="en-US" dirty="0" smtClean="0"/>
+              <a:rPr lang="en-US" dirty="0"/>
               <a:t>AVC</a:t>
             </a:r>
             <a:endParaRPr lang="vi-VN" dirty="0"/>
@@ -38548,16 +38563,8 @@
           <a:p>
             <a:pPr algn="ctr"/>
             <a:r>
-              <a:rPr lang="en-US" dirty="0" smtClean="0"/>
-              <a:t>DY </a:t>
-            </a:r>
-            <a:r>
               <a:rPr lang="en-US" dirty="0"/>
-              <a:t>coordinators</a:t>
-            </a:r>
-            <a:r>
-              <a:rPr lang="en-US" dirty="0" smtClean="0"/>
-              <a:t> </a:t>
+              <a:t>DY coordinators </a:t>
             </a:r>
             <a:endParaRPr lang="vi-VN" dirty="0"/>
           </a:p>
@@ -38600,7 +38607,7 @@
           <a:p>
             <a:pPr algn="ctr"/>
             <a:r>
-              <a:rPr lang="en-US" dirty="0" smtClean="0"/>
+              <a:rPr lang="en-US" dirty="0"/>
               <a:t>Students</a:t>
             </a:r>
             <a:endParaRPr lang="vi-VN" dirty="0"/>
@@ -38794,13 +38801,8 @@
             </a:pPr>
             <a:r>
               <a:rPr lang="en-US" sz="1400" dirty="0"/>
-              <a:t>R</a:t>
+              <a:t>Responded by message</a:t>
             </a:r>
-            <a:r>
-              <a:rPr lang="en-US" sz="1400" dirty="0" smtClean="0"/>
-              <a:t>esponded by message</a:t>
-            </a:r>
-            <a:endParaRPr lang="en-US" sz="1400" dirty="0"/>
           </a:p>
         </p:txBody>
       </p:sp>
@@ -38829,17 +38831,8 @@
             </a:pPr>
             <a:r>
               <a:rPr lang="en-US" sz="1800" dirty="0"/>
-              <a:t>M</a:t>
+              <a:t>Manually check and total count </a:t>
             </a:r>
-            <a:r>
-              <a:rPr lang="en-US" sz="1800" dirty="0" smtClean="0"/>
-              <a:t>anually check and </a:t>
-            </a:r>
-            <a:r>
-              <a:rPr lang="en-US" sz="1800" dirty="0"/>
-              <a:t>total count </a:t>
-            </a:r>
-            <a:endParaRPr lang="en-US" sz="1800" dirty="0"/>
           </a:p>
         </p:txBody>
       </p:sp>
@@ -38867,10 +38860,9 @@
               <a:buNone/>
             </a:pPr>
             <a:r>
-              <a:rPr lang="en-US" sz="1400" dirty="0" smtClean="0"/>
+              <a:rPr lang="en-US" sz="1400" dirty="0"/>
               <a:t>Report</a:t>
             </a:r>
-            <a:endParaRPr lang="en-US" sz="1400" dirty="0"/>
           </a:p>
         </p:txBody>
       </p:sp>
@@ -38896,13 +38888,8 @@
           <a:p>
             <a:r>
               <a:rPr lang="en-US" dirty="0"/>
-              <a:t>When they are abroad, they are significantly harder to </a:t>
+              <a:t>When they are abroad, they are significantly harder to contact. </a:t>
             </a:r>
-            <a:r>
-              <a:rPr lang="en-US" dirty="0" smtClean="0"/>
-              <a:t>contact. </a:t>
-            </a:r>
-            <a:endParaRPr lang="en-US" dirty="0"/>
           </a:p>
         </p:txBody>
       </p:sp>
@@ -39009,7 +38996,7 @@
             <a:pPr lvl="0"/>
             <a:r>
               <a:rPr lang="en-MY" sz="1800" dirty="0"/>
-              <a:t>Coordinators can only send notifications to their own students.</a:t>
+              <a:t>Coordinators can only send notifications to their faculty’s students.</a:t>
             </a:r>
             <a:endParaRPr lang="vi-VN" sz="1800" dirty="0"/>
           </a:p>
@@ -39025,7 +39012,7 @@
             <a:pPr lvl="0"/>
             <a:r>
               <a:rPr lang="en-MY" sz="1800" dirty="0"/>
-              <a:t>Student can view information about themselves and their host organisation and country.</a:t>
+              <a:t>Student can view information about themselves and their host organization and country.</a:t>
             </a:r>
             <a:endParaRPr lang="vi-VN" sz="1800" dirty="0"/>
           </a:p>
@@ -39057,7 +39044,7 @@
             <a:pPr lvl="0"/>
             <a:r>
               <a:rPr lang="en-MY" sz="1800" dirty="0"/>
-              <a:t>Website administrator can generate a report from the website.</a:t>
+              <a:t>Website administrator can review a report from the website.</a:t>
             </a:r>
             <a:endParaRPr lang="vi-VN" sz="1800" dirty="0"/>
           </a:p>
@@ -39141,10 +39128,9 @@
               <a:buNone/>
             </a:pPr>
             <a:r>
-              <a:rPr lang="en-US" sz="1400" dirty="0" smtClean="0"/>
+              <a:rPr lang="en-US" sz="1400" dirty="0"/>
               <a:t>DYC App</a:t>
             </a:r>
-            <a:endParaRPr lang="en-US" sz="1400" dirty="0"/>
           </a:p>
         </p:txBody>
       </p:sp>
@@ -39172,10 +39158,9 @@
               <a:buNone/>
             </a:pPr>
             <a:r>
-              <a:rPr lang="en-US" sz="1400" dirty="0" smtClean="0"/>
+              <a:rPr lang="en-US" sz="1400" dirty="0"/>
               <a:t>Student App</a:t>
             </a:r>
-            <a:endParaRPr lang="en-US" sz="1400" dirty="0"/>
           </a:p>
         </p:txBody>
       </p:sp>
@@ -39227,14 +39212,9 @@
               <a:buNone/>
             </a:pPr>
             <a:r>
-              <a:rPr lang="en-US" sz="1400" dirty="0" smtClean="0"/>
-              <a:t>Web </a:t>
+              <a:rPr lang="en-US" sz="1400" dirty="0"/>
+              <a:t>Web Admin</a:t>
             </a:r>
-            <a:r>
-              <a:rPr lang="en-US" sz="1400" dirty="0" smtClean="0"/>
-              <a:t>Admin</a:t>
-            </a:r>
-            <a:endParaRPr lang="en-US" sz="1400" dirty="0"/>
           </a:p>
         </p:txBody>
       </p:sp>
@@ -39324,12 +39304,8 @@
               <a:buNone/>
             </a:pPr>
             <a:r>
-              <a:rPr lang="en-MY" sz="1800" b="1" dirty="0" smtClean="0"/>
-              <a:t>Student </a:t>
-            </a:r>
-            <a:r>
               <a:rPr lang="en-MY" sz="1800" b="1" dirty="0"/>
-              <a:t>:</a:t>
+              <a:t>Student :</a:t>
             </a:r>
             <a:endParaRPr lang="vi-VN" sz="1800" dirty="0"/>
           </a:p>
@@ -39361,7 +39337,7 @@
             <a:pPr lvl="0"/>
             <a:r>
               <a:rPr lang="en-MY" sz="1800" dirty="0"/>
-              <a:t>See basic information of the organisation they are attached to.</a:t>
+              <a:t>See basic information of the organization they are sent to.</a:t>
             </a:r>
             <a:endParaRPr lang="vi-VN" sz="1800" dirty="0"/>
           </a:p>
@@ -39369,7 +39345,7 @@
             <a:pPr lvl="0"/>
             <a:r>
               <a:rPr lang="en-MY" sz="1800" dirty="0"/>
-              <a:t>Give report to their Discovery Year coordinators in cases of emergency.</a:t>
+              <a:t>Give report to their DYC in cases of emergency.</a:t>
             </a:r>
             <a:endParaRPr lang="vi-VN" sz="1800" dirty="0"/>
           </a:p>
@@ -39377,7 +39353,7 @@
             <a:pPr lvl="0"/>
             <a:r>
               <a:rPr lang="en-MY" sz="1800" dirty="0"/>
-              <a:t>Receive notification from their Coordinators or Administrators.</a:t>
+              <a:t>Receive notification from their teachers.</a:t>
             </a:r>
             <a:endParaRPr lang="vi-VN" sz="1800" dirty="0"/>
           </a:p>
@@ -39394,6 +39370,13 @@
             <a:r>
               <a:rPr lang="en-MY" sz="1800" dirty="0"/>
               <a:t>Ability to update their new phone number while in host country.</a:t>
+            </a:r>
+          </a:p>
+          <a:p>
+            <a:pPr lvl="0"/>
+            <a:r>
+              <a:rPr lang="en-MY" sz="1800" dirty="0"/>
+              <a:t>Submit their coordinates when click “Emergency Button”</a:t>
             </a:r>
             <a:endParaRPr lang="vi-VN" sz="1800" dirty="0"/>
           </a:p>
@@ -39515,12 +39498,8 @@
               <a:buNone/>
             </a:pPr>
             <a:r>
-              <a:rPr lang="en-MY" sz="1800" b="1" dirty="0" smtClean="0"/>
-              <a:t>Coordinator </a:t>
-            </a:r>
-            <a:r>
               <a:rPr lang="en-MY" sz="1800" b="1" dirty="0"/>
-              <a:t>:</a:t>
+              <a:t>Coordinator :</a:t>
             </a:r>
             <a:endParaRPr lang="vi-VN" sz="1800" dirty="0"/>
           </a:p>
@@ -39585,6 +39564,13 @@
             <a:r>
               <a:rPr lang="en-MY" sz="1800" dirty="0"/>
               <a:t>Receive notification from Administrator.</a:t>
+            </a:r>
+          </a:p>
+          <a:p>
+            <a:pPr lvl="0"/>
+            <a:r>
+              <a:rPr lang="en-MY" sz="1800" dirty="0"/>
+              <a:t>Create report to Administrator.</a:t>
             </a:r>
             <a:endParaRPr lang="vi-VN" sz="1800" dirty="0"/>
           </a:p>
@@ -40757,26 +40743,6 @@
 </file>
 
 <file path=customXml/item1.xml><?xml version="1.0" encoding="utf-8"?>
-<?mso-contentType ?>
-<FormTemplates xmlns="http://schemas.microsoft.com/sharepoint/v3/contenttype/forms">
-  <Display>DocumentLibraryForm</Display>
-  <Edit>DocumentLibraryForm</Edit>
-  <New>DocumentLibraryForm</New>
-</FormTemplates>
-</file>
-
-<file path=customXml/item2.xml><?xml version="1.0" encoding="utf-8"?>
-<p:properties xmlns:p="http://schemas.microsoft.com/office/2006/metadata/properties" xmlns:xsi="http://www.w3.org/2001/XMLSchema-instance" xmlns:pc="http://schemas.microsoft.com/office/infopath/2007/PartnerControls">
-  <documentManagement>
-    <VSO_x0020_item_x0020_id xmlns="40262f94-9f35-4ac3-9a90-690165a166b7" xsi:nil="true"/>
-    <Assetid_x0020_ xmlns="40262f94-9f35-4ac3-9a90-690165a166b7" xsi:nil="true"/>
-    <Item_x0020_Details xmlns="40262f94-9f35-4ac3-9a90-690165a166b7" xsi:nil="true"/>
-    <Template_x0020_details xmlns="40262f94-9f35-4ac3-9a90-690165a166b7" xsi:nil="true"/>
-  </documentManagement>
-</p:properties>
-</file>
-
-<file path=customXml/item3.xml><?xml version="1.0" encoding="utf-8"?>
 <ct:contentTypeSchema xmlns:ct="http://schemas.microsoft.com/office/2006/metadata/contentType" xmlns:ma="http://schemas.microsoft.com/office/2006/metadata/properties/metaAttributes" ct:_="" ma:_="" ma:contentTypeName="Document" ma:contentTypeID="0x010100AA3F7D94069FF64A86F7DFF56D60E3BE" ma:contentTypeVersion="6" ma:contentTypeDescription="Create a new document." ma:contentTypeScope="" ma:versionID="c32302c77d4085ecf495bdddb7f5e889">
   <xsd:schema xmlns:xsd="http://www.w3.org/2001/XMLSchema" xmlns:xs="http://www.w3.org/2001/XMLSchema" xmlns:p="http://schemas.microsoft.com/office/2006/metadata/properties" xmlns:ns2="a4f35948-e619-41b3-aa29-22878b09cfd2" xmlns:ns3="40262f94-9f35-4ac3-9a90-690165a166b7" targetNamespace="http://schemas.microsoft.com/office/2006/metadata/properties" ma:root="true" ma:fieldsID="4ab5ae46be95f9d0be6107e8200be7a2" ns2:_="" ns3:_="">
     <xsd:import namespace="a4f35948-e619-41b3-aa29-22878b09cfd2"/>
@@ -40957,10 +40923,41 @@
 </ct:contentTypeSchema>
 </file>
 
+<file path=customXml/item2.xml><?xml version="1.0" encoding="utf-8"?>
+<p:properties xmlns:p="http://schemas.microsoft.com/office/2006/metadata/properties" xmlns:xsi="http://www.w3.org/2001/XMLSchema-instance" xmlns:pc="http://schemas.microsoft.com/office/infopath/2007/PartnerControls">
+  <documentManagement>
+    <VSO_x0020_item_x0020_id xmlns="40262f94-9f35-4ac3-9a90-690165a166b7" xsi:nil="true"/>
+    <Assetid_x0020_ xmlns="40262f94-9f35-4ac3-9a90-690165a166b7" xsi:nil="true"/>
+    <Item_x0020_Details xmlns="40262f94-9f35-4ac3-9a90-690165a166b7" xsi:nil="true"/>
+    <Template_x0020_details xmlns="40262f94-9f35-4ac3-9a90-690165a166b7" xsi:nil="true"/>
+  </documentManagement>
+</p:properties>
+</file>
+
+<file path=customXml/item3.xml><?xml version="1.0" encoding="utf-8"?>
+<?mso-contentType ?>
+<FormTemplates xmlns="http://schemas.microsoft.com/sharepoint/v3/contenttype/forms">
+  <Display>DocumentLibraryForm</Display>
+  <Edit>DocumentLibraryForm</Edit>
+  <New>DocumentLibraryForm</New>
+</FormTemplates>
+</file>
+
 <file path=customXml/itemProps1.xml><?xml version="1.0" encoding="utf-8"?>
-<ds:datastoreItem xmlns:ds="http://schemas.openxmlformats.org/officeDocument/2006/customXml" ds:itemID="{B024FD56-CE1B-42FC-9E83-BFBF160724C6}">
+<ds:datastoreItem xmlns:ds="http://schemas.openxmlformats.org/officeDocument/2006/customXml" ds:itemID="{6253D857-4181-4777-8893-6E45A690F9F7}">
   <ds:schemaRefs>
-    <ds:schemaRef ds:uri="http://schemas.microsoft.com/sharepoint/v3/contenttype/forms"/>
+    <ds:schemaRef ds:uri="http://schemas.microsoft.com/office/2006/metadata/contentType"/>
+    <ds:schemaRef ds:uri="http://schemas.microsoft.com/office/2006/metadata/properties/metaAttributes"/>
+    <ds:schemaRef ds:uri="http://www.w3.org/2001/XMLSchema"/>
+    <ds:schemaRef ds:uri="http://schemas.microsoft.com/office/2006/metadata/properties"/>
+    <ds:schemaRef ds:uri="a4f35948-e619-41b3-aa29-22878b09cfd2"/>
+    <ds:schemaRef ds:uri="40262f94-9f35-4ac3-9a90-690165a166b7"/>
+    <ds:schemaRef ds:uri="http://schemas.microsoft.com/office/2006/documentManagement/types"/>
+    <ds:schemaRef ds:uri="http://schemas.microsoft.com/office/infopath/2007/PartnerControls"/>
+    <ds:schemaRef ds:uri="http://schemas.openxmlformats.org/package/2006/metadata/core-properties"/>
+    <ds:schemaRef ds:uri="http://purl.org/dc/elements/1.1/"/>
+    <ds:schemaRef ds:uri="http://purl.org/dc/terms/"/>
+    <ds:schemaRef ds:uri="http://schemas.microsoft.com/internal/obd"/>
   </ds:schemaRefs>
 </ds:datastoreItem>
 </file>
@@ -40983,20 +40980,9 @@
 </file>
 
 <file path=customXml/itemProps3.xml><?xml version="1.0" encoding="utf-8"?>
-<ds:datastoreItem xmlns:ds="http://schemas.openxmlformats.org/officeDocument/2006/customXml" ds:itemID="{6253D857-4181-4777-8893-6E45A690F9F7}">
+<ds:datastoreItem xmlns:ds="http://schemas.openxmlformats.org/officeDocument/2006/customXml" ds:itemID="{B024FD56-CE1B-42FC-9E83-BFBF160724C6}">
   <ds:schemaRefs>
-    <ds:schemaRef ds:uri="http://schemas.microsoft.com/office/2006/metadata/contentType"/>
-    <ds:schemaRef ds:uri="http://schemas.microsoft.com/office/2006/metadata/properties/metaAttributes"/>
-    <ds:schemaRef ds:uri="http://www.w3.org/2001/XMLSchema"/>
-    <ds:schemaRef ds:uri="http://schemas.microsoft.com/office/2006/metadata/properties"/>
-    <ds:schemaRef ds:uri="a4f35948-e619-41b3-aa29-22878b09cfd2"/>
-    <ds:schemaRef ds:uri="40262f94-9f35-4ac3-9a90-690165a166b7"/>
-    <ds:schemaRef ds:uri="http://schemas.microsoft.com/office/2006/documentManagement/types"/>
-    <ds:schemaRef ds:uri="http://schemas.microsoft.com/office/infopath/2007/PartnerControls"/>
-    <ds:schemaRef ds:uri="http://schemas.openxmlformats.org/package/2006/metadata/core-properties"/>
-    <ds:schemaRef ds:uri="http://purl.org/dc/elements/1.1/"/>
-    <ds:schemaRef ds:uri="http://purl.org/dc/terms/"/>
-    <ds:schemaRef ds:uri="http://schemas.microsoft.com/internal/obd"/>
+    <ds:schemaRef ds:uri="http://schemas.microsoft.com/sharepoint/v3/contenttype/forms"/>
   </ds:schemaRefs>
 </ds:datastoreItem>
 </file>
</xml_diff>

<commit_message>
BinhNTT_Fixes wrong information in slide presentation
</commit_message>
<xml_diff>
--- a/Report/Report1_DYs-Group_Slide.pptx
+++ b/Report/Report1_DYs-Group_Slide.pptx
@@ -226,7 +226,7 @@
           <a:p>
             <a:fld id="{41658A34-83F4-4B2E-BC5A-DE51EE8822F9}" type="datetimeFigureOut">
               <a:rPr lang="en-US" smtClean="0"/>
-              <a:t>10/15/18</a:t>
+              <a:t>10/16/18</a:t>
             </a:fld>
             <a:endParaRPr lang="en-US"/>
           </a:p>
@@ -391,7 +391,7 @@
           <a:p>
             <a:fld id="{7F2E1917-0BAF-4687-978A-82FFF05559C3}" type="datetimeFigureOut">
               <a:rPr lang="en-US" smtClean="0"/>
-              <a:t>10/15/18</a:t>
+              <a:t>10/16/18</a:t>
             </a:fld>
             <a:endParaRPr lang="en-US"/>
           </a:p>
@@ -1580,7 +1580,7 @@
           <a:p>
             <a:fld id="{84EAB7D7-3608-4730-B2E2-670834DF882C}" type="datetimeFigureOut">
               <a:rPr lang="en-US" smtClean="0"/>
-              <a:t>10/15/18</a:t>
+              <a:t>10/16/18</a:t>
             </a:fld>
             <a:endParaRPr lang="en-US"/>
           </a:p>
@@ -3048,7 +3048,7 @@
           <a:p>
             <a:fld id="{84EAB7D7-3608-4730-B2E2-670834DF882C}" type="datetimeFigureOut">
               <a:rPr lang="en-US" smtClean="0"/>
-              <a:t>10/15/18</a:t>
+              <a:t>10/16/18</a:t>
             </a:fld>
             <a:endParaRPr lang="en-US"/>
           </a:p>
@@ -4430,7 +4430,7 @@
           <a:p>
             <a:fld id="{84EAB7D7-3608-4730-B2E2-670834DF882C}" type="datetimeFigureOut">
               <a:rPr lang="en-US" smtClean="0"/>
-              <a:t>10/15/18</a:t>
+              <a:t>10/16/18</a:t>
             </a:fld>
             <a:endParaRPr lang="en-US"/>
           </a:p>
@@ -5185,7 +5185,7 @@
           <a:p>
             <a:fld id="{84EAB7D7-3608-4730-B2E2-670834DF882C}" type="datetimeFigureOut">
               <a:rPr lang="en-US" smtClean="0"/>
-              <a:t>10/15/18</a:t>
+              <a:t>10/16/18</a:t>
             </a:fld>
             <a:endParaRPr lang="en-US"/>
           </a:p>
@@ -14271,7 +14271,7 @@
           <a:p>
             <a:fld id="{84EAB7D7-3608-4730-B2E2-670834DF882C}" type="datetimeFigureOut">
               <a:rPr lang="en-US" smtClean="0"/>
-              <a:t>10/15/18</a:t>
+              <a:t>10/16/18</a:t>
             </a:fld>
             <a:endParaRPr lang="en-US"/>
           </a:p>
@@ -21529,7 +21529,7 @@
           <a:p>
             <a:fld id="{84EAB7D7-3608-4730-B2E2-670834DF882C}" type="datetimeFigureOut">
               <a:rPr lang="en-US" smtClean="0"/>
-              <a:t>10/15/18</a:t>
+              <a:t>10/16/18</a:t>
             </a:fld>
             <a:endParaRPr lang="en-US"/>
           </a:p>
@@ -22911,7 +22911,7 @@
           <a:p>
             <a:fld id="{84EAB7D7-3608-4730-B2E2-670834DF882C}" type="datetimeFigureOut">
               <a:rPr lang="en-US" smtClean="0"/>
-              <a:t>10/15/18</a:t>
+              <a:t>10/16/18</a:t>
             </a:fld>
             <a:endParaRPr lang="en-US"/>
           </a:p>
@@ -25103,7 +25103,7 @@
           <a:p>
             <a:fld id="{84EAB7D7-3608-4730-B2E2-670834DF882C}" type="datetimeFigureOut">
               <a:rPr lang="en-US" smtClean="0"/>
-              <a:t>10/15/18</a:t>
+              <a:t>10/16/18</a:t>
             </a:fld>
             <a:endParaRPr lang="en-US"/>
           </a:p>
@@ -26215,7 +26215,7 @@
           <a:p>
             <a:fld id="{84EAB7D7-3608-4730-B2E2-670834DF882C}" type="datetimeFigureOut">
               <a:rPr lang="en-US" smtClean="0"/>
-              <a:t>10/15/18</a:t>
+              <a:t>10/16/18</a:t>
             </a:fld>
             <a:endParaRPr lang="en-US"/>
           </a:p>
@@ -27057,7 +27057,7 @@
           <a:p>
             <a:fld id="{84EAB7D7-3608-4730-B2E2-670834DF882C}" type="datetimeFigureOut">
               <a:rPr lang="en-US" smtClean="0"/>
-              <a:t>10/15/18</a:t>
+              <a:t>10/16/18</a:t>
             </a:fld>
             <a:endParaRPr lang="en-US"/>
           </a:p>
@@ -28709,7 +28709,7 @@
           <a:p>
             <a:fld id="{84EAB7D7-3608-4730-B2E2-670834DF882C}" type="datetimeFigureOut">
               <a:rPr lang="en-US" smtClean="0"/>
-              <a:t>10/15/18</a:t>
+              <a:t>10/16/18</a:t>
             </a:fld>
             <a:endParaRPr lang="en-US"/>
           </a:p>
@@ -30361,7 +30361,7 @@
           <a:p>
             <a:fld id="{84EAB7D7-3608-4730-B2E2-670834DF882C}" type="datetimeFigureOut">
               <a:rPr lang="en-US" smtClean="0"/>
-              <a:t>10/15/18</a:t>
+              <a:t>10/16/18</a:t>
             </a:fld>
             <a:endParaRPr lang="en-US"/>
           </a:p>
@@ -31837,7 +31837,7 @@
             <a:fld id="{84EAB7D7-3608-4730-B2E2-670834DF882C}" type="datetimeFigureOut">
               <a:rPr lang="en-US" smtClean="0"/>
               <a:pPr/>
-              <a:t>10/15/18</a:t>
+              <a:t>10/16/18</a:t>
             </a:fld>
             <a:endParaRPr lang="en-US"/>
           </a:p>
@@ -35835,12 +35835,16 @@
               <a:t>Create notification</a:t>
             </a:r>
             <a:r>
-              <a:rPr lang="vi-VN" sz="1800" dirty="0"/>
-              <a:t> to </a:t>
+              <a:rPr lang="vi-VN" sz="1800"/>
+              <a:t> </a:t>
+            </a:r>
+            <a:r>
+              <a:rPr lang="en-US" sz="1800"/>
+              <a:t>groups </a:t>
             </a:r>
             <a:r>
               <a:rPr lang="en-US" sz="1800" dirty="0"/>
-              <a:t>one or more groups of students at the same time.</a:t>
+              <a:t>of students at the same time.</a:t>
             </a:r>
           </a:p>
           <a:p>
@@ -39539,7 +39543,7 @@
             </a:r>
             <a:r>
               <a:rPr lang="en-US" sz="1800" dirty="0"/>
-              <a:t>one or more students at a time.</a:t>
+              <a:t>groups of students at a time.</a:t>
             </a:r>
             <a:endParaRPr lang="vi-VN" sz="1800" dirty="0"/>
           </a:p>
@@ -40743,6 +40747,17 @@
 </file>
 
 <file path=customXml/item1.xml><?xml version="1.0" encoding="utf-8"?>
+<p:properties xmlns:p="http://schemas.microsoft.com/office/2006/metadata/properties" xmlns:xsi="http://www.w3.org/2001/XMLSchema-instance" xmlns:pc="http://schemas.microsoft.com/office/infopath/2007/PartnerControls">
+  <documentManagement>
+    <VSO_x0020_item_x0020_id xmlns="40262f94-9f35-4ac3-9a90-690165a166b7" xsi:nil="true"/>
+    <Assetid_x0020_ xmlns="40262f94-9f35-4ac3-9a90-690165a166b7" xsi:nil="true"/>
+    <Item_x0020_Details xmlns="40262f94-9f35-4ac3-9a90-690165a166b7" xsi:nil="true"/>
+    <Template_x0020_details xmlns="40262f94-9f35-4ac3-9a90-690165a166b7" xsi:nil="true"/>
+  </documentManagement>
+</p:properties>
+</file>
+
+<file path=customXml/item2.xml><?xml version="1.0" encoding="utf-8"?>
 <ct:contentTypeSchema xmlns:ct="http://schemas.microsoft.com/office/2006/metadata/contentType" xmlns:ma="http://schemas.microsoft.com/office/2006/metadata/properties/metaAttributes" ct:_="" ma:_="" ma:contentTypeName="Document" ma:contentTypeID="0x010100AA3F7D94069FF64A86F7DFF56D60E3BE" ma:contentTypeVersion="6" ma:contentTypeDescription="Create a new document." ma:contentTypeScope="" ma:versionID="c32302c77d4085ecf495bdddb7f5e889">
   <xsd:schema xmlns:xsd="http://www.w3.org/2001/XMLSchema" xmlns:xs="http://www.w3.org/2001/XMLSchema" xmlns:p="http://schemas.microsoft.com/office/2006/metadata/properties" xmlns:ns2="a4f35948-e619-41b3-aa29-22878b09cfd2" xmlns:ns3="40262f94-9f35-4ac3-9a90-690165a166b7" targetNamespace="http://schemas.microsoft.com/office/2006/metadata/properties" ma:root="true" ma:fieldsID="4ab5ae46be95f9d0be6107e8200be7a2" ns2:_="" ns3:_="">
     <xsd:import namespace="a4f35948-e619-41b3-aa29-22878b09cfd2"/>
@@ -40923,17 +40938,6 @@
 </ct:contentTypeSchema>
 </file>
 
-<file path=customXml/item2.xml><?xml version="1.0" encoding="utf-8"?>
-<p:properties xmlns:p="http://schemas.microsoft.com/office/2006/metadata/properties" xmlns:xsi="http://www.w3.org/2001/XMLSchema-instance" xmlns:pc="http://schemas.microsoft.com/office/infopath/2007/PartnerControls">
-  <documentManagement>
-    <VSO_x0020_item_x0020_id xmlns="40262f94-9f35-4ac3-9a90-690165a166b7" xsi:nil="true"/>
-    <Assetid_x0020_ xmlns="40262f94-9f35-4ac3-9a90-690165a166b7" xsi:nil="true"/>
-    <Item_x0020_Details xmlns="40262f94-9f35-4ac3-9a90-690165a166b7" xsi:nil="true"/>
-    <Template_x0020_details xmlns="40262f94-9f35-4ac3-9a90-690165a166b7" xsi:nil="true"/>
-  </documentManagement>
-</p:properties>
-</file>
-
 <file path=customXml/item3.xml><?xml version="1.0" encoding="utf-8"?>
 <?mso-contentType ?>
 <FormTemplates xmlns="http://schemas.microsoft.com/sharepoint/v3/contenttype/forms">
@@ -40944,6 +40948,23 @@
 </file>
 
 <file path=customXml/itemProps1.xml><?xml version="1.0" encoding="utf-8"?>
+<ds:datastoreItem xmlns:ds="http://schemas.openxmlformats.org/officeDocument/2006/customXml" ds:itemID="{DEDD01B8-816B-49B7-8C81-03AB51D87C54}">
+  <ds:schemaRefs>
+    <ds:schemaRef ds:uri="http://schemas.microsoft.com/office/2006/documentManagement/types"/>
+    <ds:schemaRef ds:uri="http://purl.org/dc/terms/"/>
+    <ds:schemaRef ds:uri="http://schemas.openxmlformats.org/package/2006/metadata/core-properties"/>
+    <ds:schemaRef ds:uri="http://purl.org/dc/dcmitype/"/>
+    <ds:schemaRef ds:uri="http://schemas.microsoft.com/office/infopath/2007/PartnerControls"/>
+    <ds:schemaRef ds:uri="http://purl.org/dc/elements/1.1/"/>
+    <ds:schemaRef ds:uri="http://schemas.microsoft.com/office/2006/metadata/properties"/>
+    <ds:schemaRef ds:uri="40262f94-9f35-4ac3-9a90-690165a166b7"/>
+    <ds:schemaRef ds:uri="a4f35948-e619-41b3-aa29-22878b09cfd2"/>
+    <ds:schemaRef ds:uri="http://www.w3.org/XML/1998/namespace"/>
+  </ds:schemaRefs>
+</ds:datastoreItem>
+</file>
+
+<file path=customXml/itemProps2.xml><?xml version="1.0" encoding="utf-8"?>
 <ds:datastoreItem xmlns:ds="http://schemas.openxmlformats.org/officeDocument/2006/customXml" ds:itemID="{6253D857-4181-4777-8893-6E45A690F9F7}">
   <ds:schemaRefs>
     <ds:schemaRef ds:uri="http://schemas.microsoft.com/office/2006/metadata/contentType"/>
@@ -40962,23 +40983,6 @@
 </ds:datastoreItem>
 </file>
 
-<file path=customXml/itemProps2.xml><?xml version="1.0" encoding="utf-8"?>
-<ds:datastoreItem xmlns:ds="http://schemas.openxmlformats.org/officeDocument/2006/customXml" ds:itemID="{DEDD01B8-816B-49B7-8C81-03AB51D87C54}">
-  <ds:schemaRefs>
-    <ds:schemaRef ds:uri="http://schemas.microsoft.com/office/2006/documentManagement/types"/>
-    <ds:schemaRef ds:uri="http://purl.org/dc/terms/"/>
-    <ds:schemaRef ds:uri="http://schemas.openxmlformats.org/package/2006/metadata/core-properties"/>
-    <ds:schemaRef ds:uri="http://purl.org/dc/dcmitype/"/>
-    <ds:schemaRef ds:uri="http://schemas.microsoft.com/office/infopath/2007/PartnerControls"/>
-    <ds:schemaRef ds:uri="http://purl.org/dc/elements/1.1/"/>
-    <ds:schemaRef ds:uri="http://schemas.microsoft.com/office/2006/metadata/properties"/>
-    <ds:schemaRef ds:uri="40262f94-9f35-4ac3-9a90-690165a166b7"/>
-    <ds:schemaRef ds:uri="a4f35948-e619-41b3-aa29-22878b09cfd2"/>
-    <ds:schemaRef ds:uri="http://www.w3.org/XML/1998/namespace"/>
-  </ds:schemaRefs>
-</ds:datastoreItem>
-</file>
-
 <file path=customXml/itemProps3.xml><?xml version="1.0" encoding="utf-8"?>
 <ds:datastoreItem xmlns:ds="http://schemas.openxmlformats.org/officeDocument/2006/customXml" ds:itemID="{B024FD56-CE1B-42FC-9E83-BFBF160724C6}">
   <ds:schemaRefs>

</xml_diff>